<commit_message>
add content 0218 v4
</commit_message>
<xml_diff>
--- a/Presentation-ECE570.pptx
+++ b/Presentation-ECE570.pptx
@@ -23,16 +23,16 @@
     <p:sldId id="269" r:id="rId14"/>
     <p:sldId id="270" r:id="rId15"/>
     <p:sldId id="271" r:id="rId16"/>
-    <p:sldId id="272" r:id="rId17"/>
-    <p:sldId id="273" r:id="rId18"/>
-    <p:sldId id="274" r:id="rId19"/>
-    <p:sldId id="276" r:id="rId20"/>
-    <p:sldId id="277" r:id="rId21"/>
-    <p:sldId id="280" r:id="rId22"/>
-    <p:sldId id="282" r:id="rId23"/>
-    <p:sldId id="281" r:id="rId24"/>
-    <p:sldId id="283" r:id="rId25"/>
-    <p:sldId id="284" r:id="rId26"/>
+    <p:sldId id="287" r:id="rId17"/>
+    <p:sldId id="288" r:id="rId18"/>
+    <p:sldId id="289" r:id="rId19"/>
+    <p:sldId id="290" r:id="rId20"/>
+    <p:sldId id="291" r:id="rId21"/>
+    <p:sldId id="292" r:id="rId22"/>
+    <p:sldId id="293" r:id="rId23"/>
+    <p:sldId id="294" r:id="rId24"/>
+    <p:sldId id="295" r:id="rId25"/>
+    <p:sldId id="296" r:id="rId26"/>
     <p:sldId id="286" r:id="rId27"/>
   </p:sldIdLst>
   <p:sldSz cx="12192000" cy="6858000"/>
@@ -143,7 +143,7 @@
 <file path=ppt/revisionInfo.xml><?xml version="1.0" encoding="utf-8"?>
 <p1510:revInfo xmlns:a="http://schemas.openxmlformats.org/drawingml/2006/main" xmlns:r="http://schemas.openxmlformats.org/officeDocument/2006/relationships" xmlns:p1510="http://schemas.microsoft.com/office/powerpoint/2015/10/main">
   <p1510:revLst>
-    <p1510:client id="{2E77A03E-054C-4326-B095-9243998703A2}" v="3" dt="2024-03-12T18:27:48.309"/>
+    <p1510:client id="{2E77A03E-054C-4326-B095-9243998703A2}" v="4" dt="2024-03-12T18:56:35.897"/>
     <p1510:client id="{44CB9FC4-37E8-4F34-82B2-A91C695476FA}" v="1" dt="2024-03-12T08:03:04.728"/>
     <p1510:client id="{5EB8E33B-3235-90D3-0BA8-4BFDD17BD93F}" v="69" dt="2024-03-11T21:45:54.635"/>
   </p1510:revLst>
@@ -191,8 +191,8 @@
   </pc:docChgLst>
   <pc:docChgLst>
     <pc:chgData name="Chen, Wei" userId="d57daa51-ca76-4669-997f-5560acb4e7ae" providerId="ADAL" clId="{2E77A03E-054C-4326-B095-9243998703A2}"/>
-    <pc:docChg chg="custSel modSld">
-      <pc:chgData name="Chen, Wei" userId="d57daa51-ca76-4669-997f-5560acb4e7ae" providerId="ADAL" clId="{2E77A03E-054C-4326-B095-9243998703A2}" dt="2024-03-12T18:32:18.008" v="10"/>
+    <pc:docChg chg="custSel addSld delSld modSld">
+      <pc:chgData name="Chen, Wei" userId="d57daa51-ca76-4669-997f-5560acb4e7ae" providerId="ADAL" clId="{2E77A03E-054C-4326-B095-9243998703A2}" dt="2024-03-12T18:57:25.933" v="12" actId="47"/>
       <pc:docMkLst>
         <pc:docMk/>
       </pc:docMkLst>
@@ -201,6 +201,76 @@
         <pc:sldMkLst>
           <pc:docMk/>
           <pc:sldMk cId="1225020" sldId="270"/>
+        </pc:sldMkLst>
+      </pc:sldChg>
+      <pc:sldChg chg="del">
+        <pc:chgData name="Chen, Wei" userId="d57daa51-ca76-4669-997f-5560acb4e7ae" providerId="ADAL" clId="{2E77A03E-054C-4326-B095-9243998703A2}" dt="2024-03-12T18:57:25.933" v="12" actId="47"/>
+        <pc:sldMkLst>
+          <pc:docMk/>
+          <pc:sldMk cId="842063452" sldId="272"/>
+        </pc:sldMkLst>
+      </pc:sldChg>
+      <pc:sldChg chg="del">
+        <pc:chgData name="Chen, Wei" userId="d57daa51-ca76-4669-997f-5560acb4e7ae" providerId="ADAL" clId="{2E77A03E-054C-4326-B095-9243998703A2}" dt="2024-03-12T18:57:25.933" v="12" actId="47"/>
+        <pc:sldMkLst>
+          <pc:docMk/>
+          <pc:sldMk cId="3656671659" sldId="273"/>
+        </pc:sldMkLst>
+      </pc:sldChg>
+      <pc:sldChg chg="del">
+        <pc:chgData name="Chen, Wei" userId="d57daa51-ca76-4669-997f-5560acb4e7ae" providerId="ADAL" clId="{2E77A03E-054C-4326-B095-9243998703A2}" dt="2024-03-12T18:57:25.933" v="12" actId="47"/>
+        <pc:sldMkLst>
+          <pc:docMk/>
+          <pc:sldMk cId="495811585" sldId="274"/>
+        </pc:sldMkLst>
+      </pc:sldChg>
+      <pc:sldChg chg="del">
+        <pc:chgData name="Chen, Wei" userId="d57daa51-ca76-4669-997f-5560acb4e7ae" providerId="ADAL" clId="{2E77A03E-054C-4326-B095-9243998703A2}" dt="2024-03-12T18:57:25.933" v="12" actId="47"/>
+        <pc:sldMkLst>
+          <pc:docMk/>
+          <pc:sldMk cId="4187964507" sldId="276"/>
+        </pc:sldMkLst>
+      </pc:sldChg>
+      <pc:sldChg chg="del">
+        <pc:chgData name="Chen, Wei" userId="d57daa51-ca76-4669-997f-5560acb4e7ae" providerId="ADAL" clId="{2E77A03E-054C-4326-B095-9243998703A2}" dt="2024-03-12T18:57:25.933" v="12" actId="47"/>
+        <pc:sldMkLst>
+          <pc:docMk/>
+          <pc:sldMk cId="1496977718" sldId="277"/>
+        </pc:sldMkLst>
+      </pc:sldChg>
+      <pc:sldChg chg="del">
+        <pc:chgData name="Chen, Wei" userId="d57daa51-ca76-4669-997f-5560acb4e7ae" providerId="ADAL" clId="{2E77A03E-054C-4326-B095-9243998703A2}" dt="2024-03-12T18:57:25.933" v="12" actId="47"/>
+        <pc:sldMkLst>
+          <pc:docMk/>
+          <pc:sldMk cId="703889200" sldId="280"/>
+        </pc:sldMkLst>
+      </pc:sldChg>
+      <pc:sldChg chg="del">
+        <pc:chgData name="Chen, Wei" userId="d57daa51-ca76-4669-997f-5560acb4e7ae" providerId="ADAL" clId="{2E77A03E-054C-4326-B095-9243998703A2}" dt="2024-03-12T18:57:25.933" v="12" actId="47"/>
+        <pc:sldMkLst>
+          <pc:docMk/>
+          <pc:sldMk cId="21384242" sldId="281"/>
+        </pc:sldMkLst>
+      </pc:sldChg>
+      <pc:sldChg chg="del">
+        <pc:chgData name="Chen, Wei" userId="d57daa51-ca76-4669-997f-5560acb4e7ae" providerId="ADAL" clId="{2E77A03E-054C-4326-B095-9243998703A2}" dt="2024-03-12T18:57:25.933" v="12" actId="47"/>
+        <pc:sldMkLst>
+          <pc:docMk/>
+          <pc:sldMk cId="3268306119" sldId="282"/>
+        </pc:sldMkLst>
+      </pc:sldChg>
+      <pc:sldChg chg="del">
+        <pc:chgData name="Chen, Wei" userId="d57daa51-ca76-4669-997f-5560acb4e7ae" providerId="ADAL" clId="{2E77A03E-054C-4326-B095-9243998703A2}" dt="2024-03-12T18:57:25.933" v="12" actId="47"/>
+        <pc:sldMkLst>
+          <pc:docMk/>
+          <pc:sldMk cId="3480274110" sldId="283"/>
+        </pc:sldMkLst>
+      </pc:sldChg>
+      <pc:sldChg chg="del">
+        <pc:chgData name="Chen, Wei" userId="d57daa51-ca76-4669-997f-5560acb4e7ae" providerId="ADAL" clId="{2E77A03E-054C-4326-B095-9243998703A2}" dt="2024-03-12T18:57:25.933" v="12" actId="47"/>
+        <pc:sldMkLst>
+          <pc:docMk/>
+          <pc:sldMk cId="441301076" sldId="284"/>
         </pc:sldMkLst>
       </pc:sldChg>
       <pc:sldChg chg="modSp mod">
@@ -217,6 +287,76 @@
             <ac:spMk id="3" creationId="{8795D231-88FC-224F-6C35-C357447C7AE7}"/>
           </ac:spMkLst>
         </pc:spChg>
+      </pc:sldChg>
+      <pc:sldChg chg="add">
+        <pc:chgData name="Chen, Wei" userId="d57daa51-ca76-4669-997f-5560acb4e7ae" providerId="ADAL" clId="{2E77A03E-054C-4326-B095-9243998703A2}" dt="2024-03-12T18:56:35.881" v="11"/>
+        <pc:sldMkLst>
+          <pc:docMk/>
+          <pc:sldMk cId="3934064894" sldId="287"/>
+        </pc:sldMkLst>
+      </pc:sldChg>
+      <pc:sldChg chg="add">
+        <pc:chgData name="Chen, Wei" userId="d57daa51-ca76-4669-997f-5560acb4e7ae" providerId="ADAL" clId="{2E77A03E-054C-4326-B095-9243998703A2}" dt="2024-03-12T18:56:35.881" v="11"/>
+        <pc:sldMkLst>
+          <pc:docMk/>
+          <pc:sldMk cId="1457673167" sldId="288"/>
+        </pc:sldMkLst>
+      </pc:sldChg>
+      <pc:sldChg chg="add">
+        <pc:chgData name="Chen, Wei" userId="d57daa51-ca76-4669-997f-5560acb4e7ae" providerId="ADAL" clId="{2E77A03E-054C-4326-B095-9243998703A2}" dt="2024-03-12T18:56:35.881" v="11"/>
+        <pc:sldMkLst>
+          <pc:docMk/>
+          <pc:sldMk cId="1885590503" sldId="289"/>
+        </pc:sldMkLst>
+      </pc:sldChg>
+      <pc:sldChg chg="add">
+        <pc:chgData name="Chen, Wei" userId="d57daa51-ca76-4669-997f-5560acb4e7ae" providerId="ADAL" clId="{2E77A03E-054C-4326-B095-9243998703A2}" dt="2024-03-12T18:56:35.881" v="11"/>
+        <pc:sldMkLst>
+          <pc:docMk/>
+          <pc:sldMk cId="4054845082" sldId="290"/>
+        </pc:sldMkLst>
+      </pc:sldChg>
+      <pc:sldChg chg="add">
+        <pc:chgData name="Chen, Wei" userId="d57daa51-ca76-4669-997f-5560acb4e7ae" providerId="ADAL" clId="{2E77A03E-054C-4326-B095-9243998703A2}" dt="2024-03-12T18:56:35.881" v="11"/>
+        <pc:sldMkLst>
+          <pc:docMk/>
+          <pc:sldMk cId="1224865230" sldId="291"/>
+        </pc:sldMkLst>
+      </pc:sldChg>
+      <pc:sldChg chg="add">
+        <pc:chgData name="Chen, Wei" userId="d57daa51-ca76-4669-997f-5560acb4e7ae" providerId="ADAL" clId="{2E77A03E-054C-4326-B095-9243998703A2}" dt="2024-03-12T18:56:35.881" v="11"/>
+        <pc:sldMkLst>
+          <pc:docMk/>
+          <pc:sldMk cId="286480865" sldId="292"/>
+        </pc:sldMkLst>
+      </pc:sldChg>
+      <pc:sldChg chg="add">
+        <pc:chgData name="Chen, Wei" userId="d57daa51-ca76-4669-997f-5560acb4e7ae" providerId="ADAL" clId="{2E77A03E-054C-4326-B095-9243998703A2}" dt="2024-03-12T18:56:35.881" v="11"/>
+        <pc:sldMkLst>
+          <pc:docMk/>
+          <pc:sldMk cId="3929226151" sldId="293"/>
+        </pc:sldMkLst>
+      </pc:sldChg>
+      <pc:sldChg chg="add">
+        <pc:chgData name="Chen, Wei" userId="d57daa51-ca76-4669-997f-5560acb4e7ae" providerId="ADAL" clId="{2E77A03E-054C-4326-B095-9243998703A2}" dt="2024-03-12T18:56:35.881" v="11"/>
+        <pc:sldMkLst>
+          <pc:docMk/>
+          <pc:sldMk cId="1642662514" sldId="294"/>
+        </pc:sldMkLst>
+      </pc:sldChg>
+      <pc:sldChg chg="add">
+        <pc:chgData name="Chen, Wei" userId="d57daa51-ca76-4669-997f-5560acb4e7ae" providerId="ADAL" clId="{2E77A03E-054C-4326-B095-9243998703A2}" dt="2024-03-12T18:56:35.881" v="11"/>
+        <pc:sldMkLst>
+          <pc:docMk/>
+          <pc:sldMk cId="3623349076" sldId="295"/>
+        </pc:sldMkLst>
+      </pc:sldChg>
+      <pc:sldChg chg="add">
+        <pc:chgData name="Chen, Wei" userId="d57daa51-ca76-4669-997f-5560acb4e7ae" providerId="ADAL" clId="{2E77A03E-054C-4326-B095-9243998703A2}" dt="2024-03-12T18:56:35.881" v="11"/>
+        <pc:sldMkLst>
+          <pc:docMk/>
+          <pc:sldMk cId="1149690424" sldId="296"/>
+        </pc:sldMkLst>
       </pc:sldChg>
     </pc:docChg>
   </pc:docChgLst>
@@ -1023,6 +1163,266 @@
               <a:rPr lang="zh-TW" altLang="en-US" dirty="0"/>
               <a:t> </a:t>
             </a:r>
+            <a:r>
+              <a:rPr lang="en-US" altLang="zh-TW" dirty="0"/>
+              <a:t>A</a:t>
+            </a:r>
+            <a:r>
+              <a:rPr lang="zh-TW" altLang="en-US" dirty="0"/>
+              <a:t> </a:t>
+            </a:r>
+            <a:r>
+              <a:rPr lang="en-US" altLang="zh-TW" dirty="0"/>
+              <a:t>single</a:t>
+            </a:r>
+            <a:r>
+              <a:rPr lang="zh-TW" altLang="en-US" dirty="0"/>
+              <a:t> </a:t>
+            </a:r>
+            <a:r>
+              <a:rPr lang="en-US" altLang="zh-TW" dirty="0"/>
+              <a:t>SSD</a:t>
+            </a:r>
+            <a:r>
+              <a:rPr lang="zh-TW" altLang="en-US" dirty="0"/>
+              <a:t> </a:t>
+            </a:r>
+            <a:r>
+              <a:rPr lang="en-US" altLang="zh-TW" dirty="0"/>
+              <a:t>could</a:t>
+            </a:r>
+            <a:r>
+              <a:rPr lang="zh-TW" altLang="en-US" dirty="0"/>
+              <a:t> </a:t>
+            </a:r>
+            <a:r>
+              <a:rPr lang="en-US" altLang="zh-TW" dirty="0"/>
+              <a:t>have</a:t>
+            </a:r>
+            <a:r>
+              <a:rPr lang="zh-TW" altLang="en-US" dirty="0"/>
+              <a:t> </a:t>
+            </a:r>
+            <a:r>
+              <a:rPr lang="en-US" altLang="zh-TW" dirty="0"/>
+              <a:t>an</a:t>
+            </a:r>
+            <a:r>
+              <a:rPr lang="zh-TW" altLang="en-US" dirty="0"/>
+              <a:t> </a:t>
+            </a:r>
+            <a:r>
+              <a:rPr lang="en-US" altLang="zh-TW" dirty="0"/>
+              <a:t>algorithm</a:t>
+            </a:r>
+            <a:r>
+              <a:rPr lang="zh-TW" altLang="en-US" dirty="0"/>
+              <a:t> </a:t>
+            </a:r>
+            <a:r>
+              <a:rPr lang="en-US" altLang="zh-TW" dirty="0"/>
+              <a:t>to</a:t>
+            </a:r>
+            <a:r>
+              <a:rPr lang="zh-TW" altLang="en-US" dirty="0"/>
+              <a:t> </a:t>
+            </a:r>
+            <a:r>
+              <a:rPr lang="en-US" altLang="zh-TW" dirty="0"/>
+              <a:t>make</a:t>
+            </a:r>
+            <a:r>
+              <a:rPr lang="zh-TW" altLang="en-US" dirty="0"/>
+              <a:t> </a:t>
+            </a:r>
+            <a:r>
+              <a:rPr lang="en-US" altLang="zh-TW" dirty="0"/>
+              <a:t>it</a:t>
+            </a:r>
+            <a:r>
+              <a:rPr lang="zh-TW" altLang="en-US" dirty="0"/>
+              <a:t> </a:t>
+            </a:r>
+            <a:r>
+              <a:rPr lang="en-US" altLang="zh-TW" dirty="0"/>
+              <a:t>more</a:t>
+            </a:r>
+            <a:r>
+              <a:rPr lang="zh-TW" altLang="en-US" dirty="0"/>
+              <a:t> </a:t>
+            </a:r>
+            <a:r>
+              <a:rPr lang="en-US" altLang="zh-TW" dirty="0"/>
+              <a:t>efficient!</a:t>
+            </a:r>
+            <a:r>
+              <a:rPr lang="zh-TW" altLang="en-US" dirty="0"/>
+              <a:t> </a:t>
+            </a:r>
+            <a:r>
+              <a:rPr lang="en-US" altLang="zh-TW" dirty="0"/>
+              <a:t>Now</a:t>
+            </a:r>
+            <a:r>
+              <a:rPr lang="zh-TW" altLang="en-US" dirty="0"/>
+              <a:t> </a:t>
+            </a:r>
+            <a:r>
+              <a:rPr lang="en-US" altLang="zh-TW" dirty="0"/>
+              <a:t>let</a:t>
+            </a:r>
+            <a:r>
+              <a:rPr lang="zh-TW" altLang="en-US" dirty="0"/>
+              <a:t> </a:t>
+            </a:r>
+            <a:r>
+              <a:rPr lang="en-US" altLang="zh-TW" dirty="0"/>
+              <a:t>me</a:t>
+            </a:r>
+            <a:r>
+              <a:rPr lang="zh-TW" altLang="en-US" dirty="0"/>
+              <a:t> </a:t>
+            </a:r>
+            <a:r>
+              <a:rPr lang="en-US" altLang="zh-TW" dirty="0"/>
+              <a:t>guide</a:t>
+            </a:r>
+            <a:r>
+              <a:rPr lang="zh-TW" altLang="en-US" dirty="0"/>
+              <a:t> </a:t>
+            </a:r>
+            <a:r>
+              <a:rPr lang="en-US" altLang="zh-TW" dirty="0"/>
+              <a:t>you</a:t>
+            </a:r>
+            <a:r>
+              <a:rPr lang="zh-TW" altLang="en-US" dirty="0"/>
+              <a:t> </a:t>
+            </a:r>
+            <a:r>
+              <a:rPr lang="en-US" altLang="zh-TW" dirty="0"/>
+              <a:t>dive</a:t>
+            </a:r>
+            <a:r>
+              <a:rPr lang="zh-TW" altLang="en-US" dirty="0"/>
+              <a:t> </a:t>
+            </a:r>
+            <a:r>
+              <a:rPr lang="en-US" altLang="zh-TW" dirty="0"/>
+              <a:t>into</a:t>
+            </a:r>
+            <a:r>
+              <a:rPr lang="zh-TW" altLang="en-US" dirty="0"/>
+              <a:t> </a:t>
+            </a:r>
+            <a:r>
+              <a:rPr lang="en-US" altLang="zh-TW" dirty="0"/>
+              <a:t>the</a:t>
+            </a:r>
+            <a:r>
+              <a:rPr lang="zh-TW" altLang="en-US" dirty="0"/>
+              <a:t> </a:t>
+            </a:r>
+            <a:r>
+              <a:rPr lang="en-US" altLang="zh-TW" dirty="0"/>
+              <a:t>world</a:t>
+            </a:r>
+            <a:r>
+              <a:rPr lang="zh-TW" altLang="en-US" dirty="0"/>
+              <a:t> </a:t>
+            </a:r>
+            <a:r>
+              <a:rPr lang="en-US" altLang="zh-TW" dirty="0"/>
+              <a:t>of</a:t>
+            </a:r>
+            <a:r>
+              <a:rPr lang="zh-TW" altLang="en-US" dirty="0"/>
+              <a:t> </a:t>
+            </a:r>
+            <a:r>
+              <a:rPr lang="en-US" altLang="zh-TW" dirty="0"/>
+              <a:t>DVFS,</a:t>
+            </a:r>
+            <a:r>
+              <a:rPr lang="zh-TW" altLang="en-US" dirty="0"/>
+              <a:t> </a:t>
+            </a:r>
+            <a:r>
+              <a:rPr lang="en-US" altLang="zh-TW" dirty="0"/>
+              <a:t>which</a:t>
+            </a:r>
+            <a:r>
+              <a:rPr lang="zh-TW" altLang="en-US" dirty="0"/>
+              <a:t> </a:t>
+            </a:r>
+            <a:r>
+              <a:rPr lang="en-US" altLang="zh-TW" dirty="0"/>
+              <a:t>I</a:t>
+            </a:r>
+            <a:r>
+              <a:rPr lang="zh-TW" altLang="en-US" dirty="0"/>
+              <a:t> </a:t>
+            </a:r>
+            <a:r>
+              <a:rPr lang="en-US" altLang="zh-TW" dirty="0"/>
+              <a:t>will</a:t>
+            </a:r>
+            <a:r>
+              <a:rPr lang="zh-TW" altLang="en-US" dirty="0"/>
+              <a:t> </a:t>
+            </a:r>
+            <a:r>
+              <a:rPr lang="en-US" altLang="zh-TW" dirty="0"/>
+              <a:t>talk</a:t>
+            </a:r>
+            <a:r>
+              <a:rPr lang="zh-TW" altLang="en-US" dirty="0"/>
+              <a:t> </a:t>
+            </a:r>
+            <a:r>
+              <a:rPr lang="en-US" altLang="zh-TW" dirty="0"/>
+              <a:t>about</a:t>
+            </a:r>
+            <a:r>
+              <a:rPr lang="zh-TW" altLang="en-US" dirty="0"/>
+              <a:t> </a:t>
+            </a:r>
+            <a:r>
+              <a:rPr lang="en-US" altLang="zh-TW" dirty="0"/>
+              <a:t>both</a:t>
+            </a:r>
+            <a:r>
+              <a:rPr lang="zh-TW" altLang="en-US" dirty="0"/>
+              <a:t> </a:t>
+            </a:r>
+            <a:r>
+              <a:rPr lang="en-US" altLang="zh-TW" dirty="0"/>
+              <a:t>hardware</a:t>
+            </a:r>
+            <a:r>
+              <a:rPr lang="zh-TW" altLang="en-US" dirty="0"/>
+              <a:t> </a:t>
+            </a:r>
+            <a:r>
+              <a:rPr lang="en-US" altLang="zh-TW" dirty="0"/>
+              <a:t>and</a:t>
+            </a:r>
+            <a:r>
+              <a:rPr lang="zh-TW" altLang="en-US" dirty="0"/>
+              <a:t> </a:t>
+            </a:r>
+            <a:r>
+              <a:rPr lang="en-US" altLang="zh-TW" dirty="0"/>
+              <a:t>software</a:t>
+            </a:r>
+            <a:r>
+              <a:rPr lang="zh-TW" altLang="en-US" dirty="0"/>
+              <a:t> </a:t>
+            </a:r>
+            <a:r>
+              <a:rPr lang="en-US" altLang="zh-TW" dirty="0"/>
+              <a:t>side.</a:t>
+            </a:r>
             <a:endParaRPr lang="en-US" dirty="0"/>
           </a:p>
         </p:txBody>
@@ -3636,7 +4036,7 @@
             </a:r>
             <a:r>
               <a:rPr lang="en-US" altLang="zh-TW" dirty="0"/>
-              <a:t>the</a:t>
+              <a:t>two</a:t>
             </a:r>
             <a:r>
               <a:rPr lang="zh-TW" altLang="en-US" dirty="0"/>
@@ -3671,7 +4071,23 @@
             </a:r>
             <a:r>
               <a:rPr lang="en-US" altLang="zh-TW" dirty="0"/>
-              <a:t>the</a:t>
+              <a:t>there</a:t>
+            </a:r>
+            <a:r>
+              <a:rPr lang="zh-TW" altLang="en-US" dirty="0"/>
+              <a:t> </a:t>
+            </a:r>
+            <a:r>
+              <a:rPr lang="en-US" altLang="zh-TW" dirty="0"/>
+              <a:t>be</a:t>
+            </a:r>
+            <a:r>
+              <a:rPr lang="zh-TW" altLang="en-US" dirty="0"/>
+              <a:t> </a:t>
+            </a:r>
+            <a:r>
+              <a:rPr lang="en-US" altLang="zh-TW" dirty="0"/>
+              <a:t>a</a:t>
             </a:r>
             <a:r>
               <a:rPr lang="zh-TW" altLang="en-US" dirty="0"/>
@@ -3680,14 +4096,6 @@
             <a:r>
               <a:rPr lang="en-US" altLang="zh-TW" dirty="0"/>
               <a:t>difference</a:t>
-            </a:r>
-            <a:r>
-              <a:rPr lang="zh-TW" altLang="en-US" dirty="0"/>
-              <a:t> </a:t>
-            </a:r>
-            <a:r>
-              <a:rPr lang="en-US" altLang="zh-TW" dirty="0"/>
-              <a:t>happened</a:t>
             </a:r>
             <a:r>
               <a:rPr lang="zh-TW" altLang="en-US" dirty="0"/>
@@ -6087,6 +6495,26 @@
               <a:t>to</a:t>
             </a:r>
             <a:r>
+              <a:rPr lang="zh-TW" altLang="en-US" b="0" i="0" dirty="0">
+                <a:solidFill>
+                  <a:srgbClr val="111111"/>
+                </a:solidFill>
+                <a:effectLst/>
+                <a:latin typeface="Source Sans Pro" panose="020B0503030403020204" pitchFamily="34" charset="0"/>
+              </a:rPr>
+              <a:t> </a:t>
+            </a:r>
+            <a:r>
+              <a:rPr lang="en-US" altLang="zh-TW" b="0" i="0" dirty="0">
+                <a:solidFill>
+                  <a:srgbClr val="111111"/>
+                </a:solidFill>
+                <a:effectLst/>
+                <a:latin typeface="Source Sans Pro" panose="020B0503030403020204" pitchFamily="34" charset="0"/>
+              </a:rPr>
+              <a:t>nearly</a:t>
+            </a:r>
+            <a:r>
               <a:rPr lang="en-US" b="0" i="0" dirty="0">
                 <a:solidFill>
                   <a:srgbClr val="111111"/>
@@ -6104,7 +6532,7 @@
                 <a:effectLst/>
                 <a:latin typeface="Source Sans Pro" panose="020B0503030403020204" pitchFamily="34" charset="0"/>
               </a:rPr>
-              <a:t>.</a:t>
+              <a:t>.The</a:t>
             </a:r>
             <a:r>
               <a:rPr lang="zh-TW" altLang="en-US" b="0" i="0" dirty="0">
@@ -6124,6 +6552,126 @@
                 <a:effectLst/>
                 <a:latin typeface="Source Sans Pro" panose="020B0503030403020204" pitchFamily="34" charset="0"/>
               </a:rPr>
+              <a:t>cores</a:t>
+            </a:r>
+            <a:r>
+              <a:rPr lang="zh-TW" altLang="en-US" b="0" i="0" dirty="0">
+                <a:solidFill>
+                  <a:srgbClr val="111111"/>
+                </a:solidFill>
+                <a:effectLst/>
+                <a:latin typeface="Source Sans Pro" panose="020B0503030403020204" pitchFamily="34" charset="0"/>
+              </a:rPr>
+              <a:t> </a:t>
+            </a:r>
+            <a:r>
+              <a:rPr lang="en-US" altLang="zh-TW" b="0" i="0" dirty="0">
+                <a:solidFill>
+                  <a:srgbClr val="111111"/>
+                </a:solidFill>
+                <a:effectLst/>
+                <a:latin typeface="Source Sans Pro" panose="020B0503030403020204" pitchFamily="34" charset="0"/>
+              </a:rPr>
+              <a:t>stay</a:t>
+            </a:r>
+            <a:r>
+              <a:rPr lang="zh-TW" altLang="en-US" b="0" i="0" dirty="0">
+                <a:solidFill>
+                  <a:srgbClr val="111111"/>
+                </a:solidFill>
+                <a:effectLst/>
+                <a:latin typeface="Source Sans Pro" panose="020B0503030403020204" pitchFamily="34" charset="0"/>
+              </a:rPr>
+              <a:t> </a:t>
+            </a:r>
+            <a:r>
+              <a:rPr lang="en-US" altLang="zh-TW" b="0" i="0" dirty="0">
+                <a:solidFill>
+                  <a:srgbClr val="111111"/>
+                </a:solidFill>
+                <a:effectLst/>
+                <a:latin typeface="Source Sans Pro" panose="020B0503030403020204" pitchFamily="34" charset="0"/>
+              </a:rPr>
+              <a:t>in</a:t>
+            </a:r>
+            <a:r>
+              <a:rPr lang="zh-TW" altLang="en-US" b="0" i="0" dirty="0">
+                <a:solidFill>
+                  <a:srgbClr val="111111"/>
+                </a:solidFill>
+                <a:effectLst/>
+                <a:latin typeface="Source Sans Pro" panose="020B0503030403020204" pitchFamily="34" charset="0"/>
+              </a:rPr>
+              <a:t> </a:t>
+            </a:r>
+            <a:r>
+              <a:rPr lang="en-US" altLang="zh-TW" b="0" i="0" dirty="0">
+                <a:solidFill>
+                  <a:srgbClr val="111111"/>
+                </a:solidFill>
+                <a:effectLst/>
+                <a:latin typeface="Source Sans Pro" panose="020B0503030403020204" pitchFamily="34" charset="0"/>
+              </a:rPr>
+              <a:t>really</a:t>
+            </a:r>
+            <a:r>
+              <a:rPr lang="zh-TW" altLang="en-US" b="0" i="0" dirty="0">
+                <a:solidFill>
+                  <a:srgbClr val="111111"/>
+                </a:solidFill>
+                <a:effectLst/>
+                <a:latin typeface="Source Sans Pro" panose="020B0503030403020204" pitchFamily="34" charset="0"/>
+              </a:rPr>
+              <a:t> </a:t>
+            </a:r>
+            <a:r>
+              <a:rPr lang="en-US" altLang="zh-TW" b="0" i="0" dirty="0">
+                <a:solidFill>
+                  <a:srgbClr val="111111"/>
+                </a:solidFill>
+                <a:effectLst/>
+                <a:latin typeface="Source Sans Pro" panose="020B0503030403020204" pitchFamily="34" charset="0"/>
+              </a:rPr>
+              <a:t>low</a:t>
+            </a:r>
+            <a:r>
+              <a:rPr lang="zh-TW" altLang="en-US" b="0" i="0" dirty="0">
+                <a:solidFill>
+                  <a:srgbClr val="111111"/>
+                </a:solidFill>
+                <a:effectLst/>
+                <a:latin typeface="Source Sans Pro" panose="020B0503030403020204" pitchFamily="34" charset="0"/>
+              </a:rPr>
+              <a:t> </a:t>
+            </a:r>
+            <a:r>
+              <a:rPr lang="en-US" altLang="zh-TW" b="0" i="0" dirty="0">
+                <a:solidFill>
+                  <a:srgbClr val="111111"/>
+                </a:solidFill>
+                <a:effectLst/>
+                <a:latin typeface="Source Sans Pro" panose="020B0503030403020204" pitchFamily="34" charset="0"/>
+              </a:rPr>
+              <a:t>frequency.</a:t>
+            </a:r>
+            <a:r>
+              <a:rPr lang="zh-TW" altLang="en-US" b="0" i="0" dirty="0">
+                <a:solidFill>
+                  <a:srgbClr val="111111"/>
+                </a:solidFill>
+                <a:effectLst/>
+                <a:latin typeface="Source Sans Pro" panose="020B0503030403020204" pitchFamily="34" charset="0"/>
+              </a:rPr>
+              <a:t> </a:t>
+            </a:r>
+            <a:r>
+              <a:rPr lang="en-US" altLang="zh-TW" b="0" i="0" dirty="0">
+                <a:solidFill>
+                  <a:srgbClr val="111111"/>
+                </a:solidFill>
+                <a:effectLst/>
+                <a:latin typeface="Source Sans Pro" panose="020B0503030403020204" pitchFamily="34" charset="0"/>
+              </a:rPr>
               <a:t>CPU</a:t>
             </a:r>
             <a:r>
@@ -6325,6 +6873,256 @@
                 <a:latin typeface="Source Sans Pro" panose="020B0503030403020204" pitchFamily="34" charset="0"/>
               </a:rPr>
               <a:t>energy)</a:t>
+            </a:r>
+            <a:r>
+              <a:rPr lang="zh-TW" altLang="en-US" b="0" i="0" dirty="0">
+                <a:solidFill>
+                  <a:srgbClr val="111111"/>
+                </a:solidFill>
+                <a:effectLst/>
+                <a:latin typeface="Source Sans Pro" panose="020B0503030403020204" pitchFamily="34" charset="0"/>
+              </a:rPr>
+              <a:t> </a:t>
+            </a:r>
+            <a:r>
+              <a:rPr lang="en-US" altLang="zh-TW" b="0" i="0" dirty="0">
+                <a:solidFill>
+                  <a:srgbClr val="111111"/>
+                </a:solidFill>
+                <a:effectLst/>
+                <a:latin typeface="Source Sans Pro" panose="020B0503030403020204" pitchFamily="34" charset="0"/>
+              </a:rPr>
+              <a:t>Once</a:t>
+            </a:r>
+            <a:r>
+              <a:rPr lang="zh-TW" altLang="en-US" b="0" i="0" dirty="0">
+                <a:solidFill>
+                  <a:srgbClr val="111111"/>
+                </a:solidFill>
+                <a:effectLst/>
+                <a:latin typeface="Source Sans Pro" panose="020B0503030403020204" pitchFamily="34" charset="0"/>
+              </a:rPr>
+              <a:t> </a:t>
+            </a:r>
+            <a:r>
+              <a:rPr lang="en-US" altLang="zh-TW" b="0" i="0" dirty="0">
+                <a:solidFill>
+                  <a:srgbClr val="111111"/>
+                </a:solidFill>
+                <a:effectLst/>
+                <a:latin typeface="Source Sans Pro" panose="020B0503030403020204" pitchFamily="34" charset="0"/>
+              </a:rPr>
+              <a:t>the</a:t>
+            </a:r>
+            <a:r>
+              <a:rPr lang="zh-TW" altLang="en-US" b="0" i="0" dirty="0">
+                <a:solidFill>
+                  <a:srgbClr val="111111"/>
+                </a:solidFill>
+                <a:effectLst/>
+                <a:latin typeface="Source Sans Pro" panose="020B0503030403020204" pitchFamily="34" charset="0"/>
+              </a:rPr>
+              <a:t> </a:t>
+            </a:r>
+            <a:r>
+              <a:rPr lang="en-US" altLang="zh-TW" b="0" i="0" dirty="0">
+                <a:solidFill>
+                  <a:srgbClr val="111111"/>
+                </a:solidFill>
+                <a:effectLst/>
+                <a:latin typeface="Source Sans Pro" panose="020B0503030403020204" pitchFamily="34" charset="0"/>
+              </a:rPr>
+              <a:t>frequency,</a:t>
+            </a:r>
+            <a:r>
+              <a:rPr lang="zh-TW" altLang="en-US" b="0" i="0" dirty="0">
+                <a:solidFill>
+                  <a:srgbClr val="111111"/>
+                </a:solidFill>
+                <a:effectLst/>
+                <a:latin typeface="Source Sans Pro" panose="020B0503030403020204" pitchFamily="34" charset="0"/>
+              </a:rPr>
+              <a:t> </a:t>
+            </a:r>
+            <a:r>
+              <a:rPr lang="en-US" altLang="zh-TW" b="0" i="0" dirty="0">
+                <a:solidFill>
+                  <a:srgbClr val="111111"/>
+                </a:solidFill>
+                <a:effectLst/>
+                <a:latin typeface="Source Sans Pro" panose="020B0503030403020204" pitchFamily="34" charset="0"/>
+              </a:rPr>
+              <a:t>the</a:t>
+            </a:r>
+            <a:r>
+              <a:rPr lang="zh-TW" altLang="en-US" b="0" i="0" dirty="0">
+                <a:solidFill>
+                  <a:srgbClr val="111111"/>
+                </a:solidFill>
+                <a:effectLst/>
+                <a:latin typeface="Source Sans Pro" panose="020B0503030403020204" pitchFamily="34" charset="0"/>
+              </a:rPr>
+              <a:t> </a:t>
+            </a:r>
+            <a:r>
+              <a:rPr lang="en-US" altLang="zh-TW" b="0" i="0" dirty="0">
+                <a:solidFill>
+                  <a:srgbClr val="111111"/>
+                </a:solidFill>
+                <a:effectLst/>
+                <a:latin typeface="Source Sans Pro" panose="020B0503030403020204" pitchFamily="34" charset="0"/>
+              </a:rPr>
+              <a:t>energy</a:t>
+            </a:r>
+            <a:r>
+              <a:rPr lang="zh-TW" altLang="en-US" b="0" i="0" dirty="0">
+                <a:solidFill>
+                  <a:srgbClr val="111111"/>
+                </a:solidFill>
+                <a:effectLst/>
+                <a:latin typeface="Source Sans Pro" panose="020B0503030403020204" pitchFamily="34" charset="0"/>
+              </a:rPr>
+              <a:t> </a:t>
+            </a:r>
+            <a:r>
+              <a:rPr lang="en-US" altLang="zh-TW" b="0" i="0" dirty="0">
+                <a:solidFill>
+                  <a:srgbClr val="111111"/>
+                </a:solidFill>
+                <a:effectLst/>
+                <a:latin typeface="Source Sans Pro" panose="020B0503030403020204" pitchFamily="34" charset="0"/>
+              </a:rPr>
+              <a:t>saving</a:t>
+            </a:r>
+            <a:r>
+              <a:rPr lang="zh-TW" altLang="en-US" b="0" i="0" dirty="0">
+                <a:solidFill>
+                  <a:srgbClr val="111111"/>
+                </a:solidFill>
+                <a:effectLst/>
+                <a:latin typeface="Source Sans Pro" panose="020B0503030403020204" pitchFamily="34" charset="0"/>
+              </a:rPr>
+              <a:t> </a:t>
+            </a:r>
+            <a:r>
+              <a:rPr lang="en-US" altLang="zh-TW" b="0" i="0" dirty="0">
+                <a:solidFill>
+                  <a:srgbClr val="111111"/>
+                </a:solidFill>
+                <a:effectLst/>
+                <a:latin typeface="Source Sans Pro" panose="020B0503030403020204" pitchFamily="34" charset="0"/>
+              </a:rPr>
+              <a:t>applying</a:t>
+            </a:r>
+            <a:r>
+              <a:rPr lang="zh-TW" altLang="en-US" b="0" i="0" dirty="0">
+                <a:solidFill>
+                  <a:srgbClr val="111111"/>
+                </a:solidFill>
+                <a:effectLst/>
+                <a:latin typeface="Source Sans Pro" panose="020B0503030403020204" pitchFamily="34" charset="0"/>
+              </a:rPr>
+              <a:t> </a:t>
+            </a:r>
+            <a:r>
+              <a:rPr lang="en-US" altLang="zh-TW" b="0" i="0" dirty="0">
+                <a:solidFill>
+                  <a:srgbClr val="111111"/>
+                </a:solidFill>
+                <a:effectLst/>
+                <a:latin typeface="Source Sans Pro" panose="020B0503030403020204" pitchFamily="34" charset="0"/>
+              </a:rPr>
+              <a:t>DVFS</a:t>
+            </a:r>
+            <a:r>
+              <a:rPr lang="zh-TW" altLang="en-US" b="0" i="0" dirty="0">
+                <a:solidFill>
+                  <a:srgbClr val="111111"/>
+                </a:solidFill>
+                <a:effectLst/>
+                <a:latin typeface="Source Sans Pro" panose="020B0503030403020204" pitchFamily="34" charset="0"/>
+              </a:rPr>
+              <a:t> </a:t>
+            </a:r>
+            <a:r>
+              <a:rPr lang="en-US" altLang="zh-TW" b="0" i="0" dirty="0">
+                <a:solidFill>
+                  <a:srgbClr val="111111"/>
+                </a:solidFill>
+                <a:effectLst/>
+                <a:latin typeface="Source Sans Pro" panose="020B0503030403020204" pitchFamily="34" charset="0"/>
+              </a:rPr>
+              <a:t>will</a:t>
+            </a:r>
+            <a:r>
+              <a:rPr lang="zh-TW" altLang="en-US" b="0" i="0" dirty="0">
+                <a:solidFill>
+                  <a:srgbClr val="111111"/>
+                </a:solidFill>
+                <a:effectLst/>
+                <a:latin typeface="Source Sans Pro" panose="020B0503030403020204" pitchFamily="34" charset="0"/>
+              </a:rPr>
+              <a:t> </a:t>
+            </a:r>
+            <a:r>
+              <a:rPr lang="en-US" altLang="zh-TW" b="0" i="0" dirty="0">
+                <a:solidFill>
+                  <a:srgbClr val="111111"/>
+                </a:solidFill>
+                <a:effectLst/>
+                <a:latin typeface="Source Sans Pro" panose="020B0503030403020204" pitchFamily="34" charset="0"/>
+              </a:rPr>
+              <a:t>be</a:t>
+            </a:r>
+            <a:r>
+              <a:rPr lang="zh-TW" altLang="en-US" b="0" i="0" dirty="0">
+                <a:solidFill>
+                  <a:srgbClr val="111111"/>
+                </a:solidFill>
+                <a:effectLst/>
+                <a:latin typeface="Source Sans Pro" panose="020B0503030403020204" pitchFamily="34" charset="0"/>
+              </a:rPr>
+              <a:t> </a:t>
+            </a:r>
+            <a:r>
+              <a:rPr lang="en-US" altLang="zh-TW" b="0" i="0" dirty="0">
+                <a:solidFill>
+                  <a:srgbClr val="111111"/>
+                </a:solidFill>
+                <a:effectLst/>
+                <a:latin typeface="Source Sans Pro" panose="020B0503030403020204" pitchFamily="34" charset="0"/>
+              </a:rPr>
+              <a:t>less</a:t>
+            </a:r>
+            <a:r>
+              <a:rPr lang="zh-TW" altLang="en-US" b="0" i="0" dirty="0">
+                <a:solidFill>
+                  <a:srgbClr val="111111"/>
+                </a:solidFill>
+                <a:effectLst/>
+                <a:latin typeface="Source Sans Pro" panose="020B0503030403020204" pitchFamily="34" charset="0"/>
+              </a:rPr>
+              <a:t> </a:t>
+            </a:r>
+            <a:r>
+              <a:rPr lang="en-US" altLang="zh-TW" b="0" i="0" dirty="0">
+                <a:solidFill>
+                  <a:srgbClr val="111111"/>
+                </a:solidFill>
+                <a:effectLst/>
+                <a:latin typeface="Source Sans Pro" panose="020B0503030403020204" pitchFamily="34" charset="0"/>
+              </a:rPr>
+              <a:t>significant.</a:t>
+            </a:r>
+            <a:r>
+              <a:rPr lang="zh-TW" altLang="en-US" b="0" i="0" dirty="0">
+                <a:solidFill>
+                  <a:srgbClr val="111111"/>
+                </a:solidFill>
+                <a:effectLst/>
+                <a:latin typeface="Source Sans Pro" panose="020B0503030403020204" pitchFamily="34" charset="0"/>
+              </a:rPr>
+              <a:t> </a:t>
             </a:r>
             <a:endParaRPr lang="en-US" b="0" i="0" dirty="0">
               <a:solidFill>
@@ -6777,6 +7575,395 @@
               <a:t>load.</a:t>
             </a:r>
           </a:p>
+          <a:p>
+            <a:r>
+              <a:rPr lang="en-US" altLang="zh-TW" dirty="0"/>
+              <a:t>We’ll</a:t>
+            </a:r>
+            <a:r>
+              <a:rPr lang="zh-TW" altLang="en-US" dirty="0"/>
+              <a:t> </a:t>
+            </a:r>
+            <a:r>
+              <a:rPr lang="en-US" altLang="zh-TW" dirty="0"/>
+              <a:t>focus</a:t>
+            </a:r>
+            <a:r>
+              <a:rPr lang="zh-TW" altLang="en-US" dirty="0"/>
+              <a:t> </a:t>
+            </a:r>
+            <a:r>
+              <a:rPr lang="en-US" altLang="zh-TW" dirty="0"/>
+              <a:t>on</a:t>
+            </a:r>
+            <a:r>
+              <a:rPr lang="zh-TW" altLang="en-US" dirty="0"/>
+              <a:t> </a:t>
+            </a:r>
+            <a:r>
+              <a:rPr lang="en-US" altLang="zh-TW" dirty="0"/>
+              <a:t>PM-1</a:t>
+            </a:r>
+            <a:r>
+              <a:rPr lang="zh-TW" altLang="en-US" dirty="0"/>
+              <a:t> </a:t>
+            </a:r>
+            <a:r>
+              <a:rPr lang="en-US" altLang="zh-TW" dirty="0"/>
+              <a:t>since</a:t>
+            </a:r>
+            <a:r>
+              <a:rPr lang="zh-TW" altLang="en-US" dirty="0"/>
+              <a:t> </a:t>
+            </a:r>
+            <a:r>
+              <a:rPr lang="en-US" altLang="zh-TW" dirty="0"/>
+              <a:t>the</a:t>
+            </a:r>
+            <a:r>
+              <a:rPr lang="zh-TW" altLang="en-US" dirty="0"/>
+              <a:t> </a:t>
+            </a:r>
+            <a:r>
+              <a:rPr lang="en-US" altLang="zh-TW" dirty="0"/>
+              <a:t>frequency</a:t>
+            </a:r>
+            <a:r>
+              <a:rPr lang="zh-TW" altLang="en-US" dirty="0"/>
+              <a:t> </a:t>
+            </a:r>
+            <a:r>
+              <a:rPr lang="en-US" altLang="zh-TW" dirty="0"/>
+              <a:t>in</a:t>
+            </a:r>
+            <a:r>
+              <a:rPr lang="zh-TW" altLang="en-US" dirty="0"/>
+              <a:t> </a:t>
+            </a:r>
+            <a:r>
+              <a:rPr lang="en-US" altLang="zh-TW" dirty="0"/>
+              <a:t>Pm2</a:t>
+            </a:r>
+            <a:r>
+              <a:rPr lang="zh-TW" altLang="en-US" dirty="0"/>
+              <a:t> </a:t>
+            </a:r>
+            <a:r>
+              <a:rPr lang="en-US" altLang="zh-TW" dirty="0"/>
+              <a:t>and</a:t>
+            </a:r>
+            <a:r>
+              <a:rPr lang="zh-TW" altLang="en-US" dirty="0"/>
+              <a:t> </a:t>
+            </a:r>
+            <a:r>
+              <a:rPr lang="en-US" altLang="zh-TW" dirty="0"/>
+              <a:t>PM3</a:t>
+            </a:r>
+            <a:r>
+              <a:rPr lang="zh-TW" altLang="en-US" dirty="0"/>
+              <a:t> </a:t>
+            </a:r>
+            <a:r>
+              <a:rPr lang="en-US" altLang="zh-TW" dirty="0"/>
+              <a:t>have</a:t>
+            </a:r>
+            <a:r>
+              <a:rPr lang="zh-TW" altLang="en-US" dirty="0"/>
+              <a:t> </a:t>
+            </a:r>
+            <a:r>
+              <a:rPr lang="en-US" altLang="zh-TW" dirty="0"/>
+              <a:t>been</a:t>
+            </a:r>
+            <a:r>
+              <a:rPr lang="zh-TW" altLang="en-US" dirty="0"/>
+              <a:t> </a:t>
+            </a:r>
+            <a:r>
+              <a:rPr lang="en-US" altLang="zh-TW" dirty="0"/>
+              <a:t>affected</a:t>
+            </a:r>
+            <a:r>
+              <a:rPr lang="zh-TW" altLang="en-US" dirty="0"/>
+              <a:t> </a:t>
+            </a:r>
+            <a:r>
+              <a:rPr lang="en-US" altLang="zh-TW" dirty="0"/>
+              <a:t>by</a:t>
+            </a:r>
+            <a:r>
+              <a:rPr lang="zh-TW" altLang="en-US" dirty="0"/>
+              <a:t> </a:t>
+            </a:r>
+            <a:r>
+              <a:rPr lang="en-US" altLang="zh-TW" dirty="0"/>
+              <a:t>the</a:t>
+            </a:r>
+            <a:r>
+              <a:rPr lang="zh-TW" altLang="en-US" dirty="0"/>
+              <a:t> </a:t>
+            </a:r>
+            <a:r>
+              <a:rPr lang="en-US" altLang="zh-TW" dirty="0"/>
+              <a:t>APIC</a:t>
+            </a:r>
+            <a:r>
+              <a:rPr lang="zh-TW" altLang="en-US" dirty="0"/>
+              <a:t> </a:t>
+            </a:r>
+            <a:r>
+              <a:rPr lang="en-US" altLang="zh-TW" dirty="0"/>
+              <a:t>state.</a:t>
+            </a:r>
+            <a:r>
+              <a:rPr lang="zh-TW" altLang="en-US" dirty="0"/>
+              <a:t> </a:t>
+            </a:r>
+            <a:endParaRPr lang="en-US" altLang="zh-TW" dirty="0"/>
+          </a:p>
+          <a:p>
+            <a:r>
+              <a:rPr lang="en-US" altLang="zh-TW" dirty="0"/>
+              <a:t>From</a:t>
+            </a:r>
+            <a:r>
+              <a:rPr lang="zh-TW" altLang="en-US" dirty="0"/>
+              <a:t> </a:t>
+            </a:r>
+            <a:r>
+              <a:rPr lang="en-US" altLang="zh-TW" dirty="0"/>
+              <a:t>PM-1,</a:t>
+            </a:r>
+            <a:r>
+              <a:rPr lang="zh-TW" altLang="en-US" dirty="0"/>
+              <a:t> </a:t>
+            </a:r>
+            <a:r>
+              <a:rPr lang="en-US" altLang="zh-TW" dirty="0"/>
+              <a:t>we</a:t>
+            </a:r>
+            <a:r>
+              <a:rPr lang="zh-TW" altLang="en-US" dirty="0"/>
+              <a:t> </a:t>
+            </a:r>
+            <a:r>
+              <a:rPr lang="en-US" altLang="zh-TW" dirty="0"/>
+              <a:t>could</a:t>
+            </a:r>
+            <a:r>
+              <a:rPr lang="zh-TW" altLang="en-US" dirty="0"/>
+              <a:t> </a:t>
+            </a:r>
+            <a:r>
+              <a:rPr lang="en-US" altLang="zh-TW" dirty="0"/>
+              <a:t>see</a:t>
+            </a:r>
+            <a:r>
+              <a:rPr lang="zh-TW" altLang="en-US" dirty="0"/>
+              <a:t> </a:t>
+            </a:r>
+            <a:r>
+              <a:rPr lang="en-US" altLang="zh-TW" dirty="0"/>
+              <a:t>there</a:t>
+            </a:r>
+          </a:p>
+          <a:p>
+            <a:endParaRPr lang="en-US" altLang="zh-TW" dirty="0"/>
+          </a:p>
+          <a:p>
+            <a:r>
+              <a:rPr lang="en-US" altLang="zh-TW" dirty="0"/>
+              <a:t>So</a:t>
+            </a:r>
+            <a:r>
+              <a:rPr lang="zh-TW" altLang="en-US" dirty="0"/>
+              <a:t> </a:t>
+            </a:r>
+            <a:r>
+              <a:rPr lang="en-US" altLang="zh-TW" dirty="0"/>
+              <a:t>the</a:t>
+            </a:r>
+            <a:r>
+              <a:rPr lang="zh-TW" altLang="en-US" dirty="0"/>
+              <a:t> </a:t>
+            </a:r>
+            <a:r>
+              <a:rPr lang="en-US" altLang="zh-TW" dirty="0"/>
+              <a:t>effectiveness</a:t>
+            </a:r>
+            <a:r>
+              <a:rPr lang="zh-TW" altLang="en-US" dirty="0"/>
+              <a:t> </a:t>
+            </a:r>
+            <a:r>
+              <a:rPr lang="en-US" altLang="zh-TW" dirty="0"/>
+              <a:t>of</a:t>
+            </a:r>
+            <a:r>
+              <a:rPr lang="zh-TW" altLang="en-US" dirty="0"/>
+              <a:t> </a:t>
+            </a:r>
+            <a:r>
+              <a:rPr lang="en-US" altLang="zh-TW" dirty="0"/>
+              <a:t>DVFS</a:t>
+            </a:r>
+            <a:r>
+              <a:rPr lang="zh-TW" altLang="en-US" dirty="0"/>
+              <a:t> </a:t>
+            </a:r>
+            <a:r>
+              <a:rPr lang="en-US" altLang="zh-TW" dirty="0"/>
+              <a:t>is</a:t>
+            </a:r>
+            <a:r>
+              <a:rPr lang="zh-TW" altLang="en-US" dirty="0"/>
+              <a:t> </a:t>
+            </a:r>
+            <a:r>
+              <a:rPr lang="en-US" altLang="zh-TW" dirty="0"/>
+              <a:t>huge.</a:t>
+            </a:r>
+            <a:r>
+              <a:rPr lang="zh-TW" altLang="en-US" dirty="0"/>
+              <a:t>  </a:t>
+            </a:r>
+            <a:r>
+              <a:rPr lang="en-US" altLang="zh-TW" dirty="0"/>
+              <a:t>But</a:t>
+            </a:r>
+            <a:r>
+              <a:rPr lang="zh-TW" altLang="en-US" dirty="0"/>
+              <a:t> </a:t>
+            </a:r>
+            <a:r>
+              <a:rPr lang="en-US" altLang="zh-TW" dirty="0"/>
+              <a:t>is</a:t>
+            </a:r>
+            <a:r>
+              <a:rPr lang="zh-TW" altLang="en-US" dirty="0"/>
+              <a:t> </a:t>
+            </a:r>
+            <a:r>
+              <a:rPr lang="en-US" altLang="zh-TW" dirty="0"/>
+              <a:t>there</a:t>
+            </a:r>
+            <a:r>
+              <a:rPr lang="zh-TW" altLang="en-US" dirty="0"/>
+              <a:t> </a:t>
+            </a:r>
+            <a:r>
+              <a:rPr lang="en-US" altLang="zh-TW" dirty="0"/>
+              <a:t>a</a:t>
+            </a:r>
+            <a:r>
+              <a:rPr lang="zh-TW" altLang="en-US" dirty="0"/>
+              <a:t> </a:t>
+            </a:r>
+            <a:r>
+              <a:rPr lang="en-US" altLang="zh-TW" dirty="0"/>
+              <a:t>better</a:t>
+            </a:r>
+            <a:r>
+              <a:rPr lang="zh-TW" altLang="en-US" dirty="0"/>
+              <a:t> </a:t>
+            </a:r>
+            <a:r>
+              <a:rPr lang="en-US" altLang="zh-TW" dirty="0"/>
+              <a:t>way?</a:t>
+            </a:r>
+          </a:p>
+          <a:p>
+            <a:r>
+              <a:rPr lang="en-US" altLang="zh-TW" dirty="0"/>
+              <a:t>Because</a:t>
+            </a:r>
+            <a:r>
+              <a:rPr lang="zh-TW" altLang="en-US" dirty="0"/>
+              <a:t> </a:t>
+            </a:r>
+            <a:r>
+              <a:rPr lang="en-US" altLang="zh-TW" dirty="0"/>
+              <a:t>lower</a:t>
+            </a:r>
+            <a:r>
+              <a:rPr lang="zh-TW" altLang="en-US" dirty="0"/>
+              <a:t> </a:t>
+            </a:r>
+            <a:r>
+              <a:rPr lang="en-US" altLang="zh-TW" dirty="0"/>
+              <a:t>frequency</a:t>
+            </a:r>
+            <a:r>
+              <a:rPr lang="zh-TW" altLang="en-US" dirty="0"/>
+              <a:t> </a:t>
+            </a:r>
+            <a:r>
+              <a:rPr lang="en-US" altLang="zh-TW" dirty="0"/>
+              <a:t>will</a:t>
+            </a:r>
+            <a:r>
+              <a:rPr lang="zh-TW" altLang="en-US" dirty="0"/>
+              <a:t> </a:t>
+            </a:r>
+            <a:r>
+              <a:rPr lang="en-US" altLang="zh-TW" dirty="0"/>
+              <a:t>be</a:t>
+            </a:r>
+            <a:r>
+              <a:rPr lang="zh-TW" altLang="en-US" dirty="0"/>
+              <a:t> </a:t>
+            </a:r>
+            <a:r>
+              <a:rPr lang="en-US" altLang="zh-TW" dirty="0"/>
+              <a:t>inefficient</a:t>
+            </a:r>
+            <a:r>
+              <a:rPr lang="zh-TW" altLang="en-US" dirty="0"/>
+              <a:t> </a:t>
+            </a:r>
+            <a:r>
+              <a:rPr lang="en-US" altLang="zh-TW" dirty="0"/>
+              <a:t>for</a:t>
+            </a:r>
+            <a:r>
+              <a:rPr lang="zh-TW" altLang="en-US" dirty="0"/>
+              <a:t> </a:t>
+            </a:r>
+            <a:r>
+              <a:rPr lang="en-US" altLang="zh-TW" dirty="0"/>
+              <a:t>programs</a:t>
+            </a:r>
+            <a:r>
+              <a:rPr lang="zh-TW" altLang="en-US" dirty="0"/>
+              <a:t> </a:t>
+            </a:r>
+            <a:r>
+              <a:rPr lang="en-US" altLang="zh-TW" dirty="0"/>
+              <a:t>demanding</a:t>
+            </a:r>
+            <a:r>
+              <a:rPr lang="zh-TW" altLang="en-US" dirty="0"/>
+              <a:t> </a:t>
+            </a:r>
+            <a:r>
+              <a:rPr lang="en-US" altLang="zh-TW" dirty="0"/>
+              <a:t>high</a:t>
+            </a:r>
+            <a:r>
+              <a:rPr lang="zh-TW" altLang="en-US" dirty="0"/>
+              <a:t> </a:t>
+            </a:r>
+            <a:r>
+              <a:rPr lang="en-US" altLang="zh-TW" dirty="0"/>
+              <a:t>performance.</a:t>
+            </a:r>
+            <a:r>
+              <a:rPr lang="zh-TW" altLang="en-US" dirty="0"/>
+              <a:t> </a:t>
+            </a:r>
+            <a:endParaRPr lang="en-US" altLang="zh-TW" dirty="0"/>
+          </a:p>
         </p:txBody>
       </p:sp>
       <p:sp>
@@ -6929,7 +8116,35 @@
             </a:r>
             <a:r>
               <a:rPr lang="zh-TW" altLang="en-US" dirty="0"/>
-              <a:t> </a:t>
+              <a:t>  </a:t>
+            </a:r>
+            <a:r>
+              <a:rPr lang="en-US" altLang="zh-TW" dirty="0"/>
+              <a:t>Let’s</a:t>
+            </a:r>
+            <a:r>
+              <a:rPr lang="zh-TW" altLang="en-US" dirty="0"/>
+              <a:t> </a:t>
+            </a:r>
+            <a:r>
+              <a:rPr lang="en-US" altLang="zh-TW" dirty="0"/>
+              <a:t>figure</a:t>
+            </a:r>
+            <a:r>
+              <a:rPr lang="zh-TW" altLang="en-US" dirty="0"/>
+              <a:t> </a:t>
+            </a:r>
+            <a:r>
+              <a:rPr lang="en-US" altLang="zh-TW" dirty="0"/>
+              <a:t>it</a:t>
+            </a:r>
+            <a:r>
+              <a:rPr lang="zh-TW" altLang="en-US" dirty="0"/>
+              <a:t> </a:t>
+            </a:r>
+            <a:r>
+              <a:rPr lang="en-US" altLang="zh-TW" dirty="0"/>
+              <a:t>out</a:t>
             </a:r>
             <a:endParaRPr lang="en-US" dirty="0"/>
           </a:p>
@@ -7988,6 +9203,22 @@
             </a:r>
             <a:r>
               <a:rPr lang="en-US" altLang="zh-TW" dirty="0"/>
+              <a:t>image</a:t>
+            </a:r>
+            <a:r>
+              <a:rPr lang="zh-TW" altLang="en-US" dirty="0"/>
+              <a:t> </a:t>
+            </a:r>
+            <a:r>
+              <a:rPr lang="en-US" altLang="zh-TW" dirty="0"/>
+              <a:t>in</a:t>
+            </a:r>
+            <a:r>
+              <a:rPr lang="zh-TW" altLang="en-US" dirty="0"/>
+              <a:t> </a:t>
+            </a:r>
+            <a:r>
+              <a:rPr lang="en-US" altLang="zh-TW" dirty="0"/>
               <a:t>right</a:t>
             </a:r>
             <a:r>
@@ -7996,7 +9227,7 @@
             </a:r>
             <a:r>
               <a:rPr lang="en-US" altLang="zh-TW" dirty="0"/>
-              <a:t>image,</a:t>
+              <a:t>side,</a:t>
             </a:r>
             <a:r>
               <a:rPr lang="zh-TW" altLang="en-US" dirty="0"/>
@@ -8795,7 +10026,17 @@
                 <a:effectLst/>
                 <a:latin typeface="Söhne"/>
               </a:rPr>
-              <a:t>Conversely, the analysis of Dynamic Voltage and Frequency Scaling (DVFS) reveals its limitations in the face of evolving CPU and platform architectures. The findings suggest that simpler power management strategies might yield better energy savings, indicating a shift away from traditional DVFS paradigms.</a:t>
+              <a:t>Conversely, the analysis of Dynamic Voltage and Frequency Scaling (DVFS) reveals its limitations in the face of evolving CPU and platform architectures. The findings suggest that simpler power management strategies might yield better energy savings</a:t>
+            </a:r>
+            <a:r>
+              <a:rPr lang="en-US" altLang="zh-TW" b="0" i="0" dirty="0">
+                <a:solidFill>
+                  <a:srgbClr val="0D0D0D"/>
+                </a:solidFill>
+                <a:effectLst/>
+                <a:latin typeface="Söhne"/>
+              </a:rPr>
+              <a:t>.</a:t>
             </a:r>
           </a:p>
           <a:p>
@@ -8808,8 +10049,68 @@
                 <a:effectLst/>
                 <a:latin typeface="Söhne"/>
               </a:rPr>
-              <a:t>Furthermore, the potential of machine learning-based predictive models emerges as a promising avenue for energy savings. By forecasting system workloads and dynamically adjusting resources, these models can significantly reduce energy consumption, offering a proactive solution to power management in computing systems.</a:t>
-            </a:r>
+              <a:t>Furthermore, the potential of machine learning-based predictive models </a:t>
+            </a:r>
+            <a:r>
+              <a:rPr lang="en-US" altLang="zh-TW" b="0" i="0" dirty="0">
+                <a:solidFill>
+                  <a:srgbClr val="0D0D0D"/>
+                </a:solidFill>
+                <a:effectLst/>
+                <a:latin typeface="Söhne"/>
+              </a:rPr>
+              <a:t>shows</a:t>
+            </a:r>
+            <a:r>
+              <a:rPr lang="zh-TW" altLang="en-US" b="0" i="0" dirty="0">
+                <a:solidFill>
+                  <a:srgbClr val="0D0D0D"/>
+                </a:solidFill>
+                <a:effectLst/>
+                <a:latin typeface="Söhne"/>
+              </a:rPr>
+              <a:t> </a:t>
+            </a:r>
+            <a:r>
+              <a:rPr lang="en-US" altLang="zh-TW" b="0" i="0" dirty="0">
+                <a:solidFill>
+                  <a:srgbClr val="0D0D0D"/>
+                </a:solidFill>
+                <a:effectLst/>
+                <a:latin typeface="Söhne"/>
+              </a:rPr>
+              <a:t>effectiveness</a:t>
+            </a:r>
+            <a:r>
+              <a:rPr lang="zh-TW" altLang="en-US" b="0" i="0" dirty="0">
+                <a:solidFill>
+                  <a:srgbClr val="0D0D0D"/>
+                </a:solidFill>
+                <a:effectLst/>
+                <a:latin typeface="Söhne"/>
+              </a:rPr>
+              <a:t> </a:t>
+            </a:r>
+            <a:r>
+              <a:rPr lang="en-US" b="0" i="0" dirty="0">
+                <a:solidFill>
+                  <a:srgbClr val="0D0D0D"/>
+                </a:solidFill>
+                <a:effectLst/>
+                <a:latin typeface="Söhne"/>
+              </a:rPr>
+              <a:t>for energy savings. By forecasting system workloads and dynamically adjusting resources, these models can significantly reduce energy consumption, offering a proactive solution to power management in computing systems.</a:t>
+            </a:r>
+          </a:p>
+          <a:p>
+            <a:pPr algn="l"/>
+            <a:endParaRPr lang="en-US" b="0" i="0" dirty="0">
+              <a:solidFill>
+                <a:srgbClr val="0D0D0D"/>
+              </a:solidFill>
+              <a:effectLst/>
+              <a:latin typeface="Söhne"/>
+            </a:endParaRPr>
           </a:p>
           <a:p>
             <a:pPr algn="l"/>
@@ -17912,7 +19213,7 @@
     </p:spTree>
     <p:extLst>
       <p:ext uri="{BB962C8B-B14F-4D97-AF65-F5344CB8AC3E}">
-        <p14:creationId xmlns:p14="http://schemas.microsoft.com/office/powerpoint/2010/main" val="842063452"/>
+        <p14:creationId xmlns:p14="http://schemas.microsoft.com/office/powerpoint/2010/main" val="3934064894"/>
       </p:ext>
     </p:extLst>
   </p:cSld>
@@ -18212,7 +19513,7 @@
     </p:spTree>
     <p:extLst>
       <p:ext uri="{BB962C8B-B14F-4D97-AF65-F5344CB8AC3E}">
-        <p14:creationId xmlns:p14="http://schemas.microsoft.com/office/powerpoint/2010/main" val="3656671659"/>
+        <p14:creationId xmlns:p14="http://schemas.microsoft.com/office/powerpoint/2010/main" val="1457673167"/>
       </p:ext>
     </p:extLst>
   </p:cSld>
@@ -18911,7 +20212,7 @@
     </p:spTree>
     <p:extLst>
       <p:ext uri="{BB962C8B-B14F-4D97-AF65-F5344CB8AC3E}">
-        <p14:creationId xmlns:p14="http://schemas.microsoft.com/office/powerpoint/2010/main" val="495811585"/>
+        <p14:creationId xmlns:p14="http://schemas.microsoft.com/office/powerpoint/2010/main" val="1885590503"/>
       </p:ext>
     </p:extLst>
   </p:cSld>
@@ -19294,7 +20595,7 @@
     </p:spTree>
     <p:extLst>
       <p:ext uri="{BB962C8B-B14F-4D97-AF65-F5344CB8AC3E}">
-        <p14:creationId xmlns:p14="http://schemas.microsoft.com/office/powerpoint/2010/main" val="4187964507"/>
+        <p14:creationId xmlns:p14="http://schemas.microsoft.com/office/powerpoint/2010/main" val="4054845082"/>
       </p:ext>
     </p:extLst>
   </p:cSld>
@@ -20147,21 +21448,6 @@
                 <a:ea typeface="Verdana" panose="020B0604030504040204" pitchFamily="34" charset="0"/>
                 <a:cs typeface="Verdana" panose="020B0604030504040204" pitchFamily="34" charset="0"/>
               </a:rPr>
-              <a:t>5</a:t>
-            </a:r>
-            <a:r>
-              <a:rPr lang="zh-TW" altLang="en-US" dirty="0">
-                <a:latin typeface="Verdana" panose="020B0604030504040204" pitchFamily="34" charset="0"/>
-                <a:cs typeface="Verdana" panose="020B0604030504040204" pitchFamily="34" charset="0"/>
-              </a:rPr>
-              <a:t> </a:t>
-            </a:r>
-            <a:r>
-              <a:rPr lang="en-US" altLang="zh-TW" dirty="0">
-                <a:latin typeface="Verdana" panose="020B0604030504040204" pitchFamily="34" charset="0"/>
-                <a:ea typeface="Verdana" panose="020B0604030504040204" pitchFamily="34" charset="0"/>
-                <a:cs typeface="Verdana" panose="020B0604030504040204" pitchFamily="34" charset="0"/>
-              </a:rPr>
               <a:t>Factors</a:t>
             </a:r>
             <a:r>
@@ -20220,13 +21506,13 @@
         </p:nvSpPr>
         <p:spPr>
           <a:xfrm>
-            <a:off x="630621" y="1418896"/>
-            <a:ext cx="10121462" cy="5286704"/>
+            <a:off x="630620" y="1418896"/>
+            <a:ext cx="10972799" cy="5286704"/>
           </a:xfrm>
         </p:spPr>
         <p:txBody>
           <a:bodyPr>
-            <a:normAutofit lnSpcReduction="10000"/>
+            <a:normAutofit/>
           </a:bodyPr>
           <a:lstStyle/>
           <a:p>
@@ -20591,7 +21877,7 @@
     </p:spTree>
     <p:extLst>
       <p:ext uri="{BB962C8B-B14F-4D97-AF65-F5344CB8AC3E}">
-        <p14:creationId xmlns:p14="http://schemas.microsoft.com/office/powerpoint/2010/main" val="1496977718"/>
+        <p14:creationId xmlns:p14="http://schemas.microsoft.com/office/powerpoint/2010/main" val="1224865230"/>
       </p:ext>
     </p:extLst>
   </p:cSld>
@@ -20933,7 +22219,7 @@
     </p:spTree>
     <p:extLst>
       <p:ext uri="{BB962C8B-B14F-4D97-AF65-F5344CB8AC3E}">
-        <p14:creationId xmlns:p14="http://schemas.microsoft.com/office/powerpoint/2010/main" val="703889200"/>
+        <p14:creationId xmlns:p14="http://schemas.microsoft.com/office/powerpoint/2010/main" val="286480865"/>
       </p:ext>
     </p:extLst>
   </p:cSld>
@@ -21172,13 +22458,252 @@
     </p:spTree>
     <p:extLst>
       <p:ext uri="{BB962C8B-B14F-4D97-AF65-F5344CB8AC3E}">
-        <p14:creationId xmlns:p14="http://schemas.microsoft.com/office/powerpoint/2010/main" val="3268306119"/>
+        <p14:creationId xmlns:p14="http://schemas.microsoft.com/office/powerpoint/2010/main" val="3929226151"/>
       </p:ext>
     </p:extLst>
   </p:cSld>
   <p:clrMapOvr>
     <a:masterClrMapping/>
   </p:clrMapOvr>
+  <p:timing>
+    <p:tnLst>
+      <p:par>
+        <p:cTn id="1" dur="indefinite" restart="never" nodeType="tmRoot">
+          <p:childTnLst>
+            <p:seq concurrent="1" nextAc="seek">
+              <p:cTn id="2" dur="indefinite" nodeType="mainSeq">
+                <p:childTnLst>
+                  <p:par>
+                    <p:cTn id="3" fill="hold">
+                      <p:stCondLst>
+                        <p:cond delay="indefinite"/>
+                      </p:stCondLst>
+                      <p:childTnLst>
+                        <p:par>
+                          <p:cTn id="4" fill="hold">
+                            <p:stCondLst>
+                              <p:cond delay="0"/>
+                            </p:stCondLst>
+                            <p:childTnLst>
+                              <p:par>
+                                <p:cTn id="5" presetID="1" presetClass="entr" presetSubtype="0" fill="hold" nodeType="clickEffect">
+                                  <p:stCondLst>
+                                    <p:cond delay="0"/>
+                                  </p:stCondLst>
+                                  <p:childTnLst>
+                                    <p:set>
+                                      <p:cBhvr>
+                                        <p:cTn id="6" dur="1" fill="hold">
+                                          <p:stCondLst>
+                                            <p:cond delay="0"/>
+                                          </p:stCondLst>
+                                        </p:cTn>
+                                        <p:tgtEl>
+                                          <p:spTgt spid="8"/>
+                                        </p:tgtEl>
+                                        <p:attrNameLst>
+                                          <p:attrName>style.visibility</p:attrName>
+                                        </p:attrNameLst>
+                                      </p:cBhvr>
+                                      <p:to>
+                                        <p:strVal val="visible"/>
+                                      </p:to>
+                                    </p:set>
+                                  </p:childTnLst>
+                                </p:cTn>
+                              </p:par>
+                            </p:childTnLst>
+                          </p:cTn>
+                        </p:par>
+                      </p:childTnLst>
+                    </p:cTn>
+                  </p:par>
+                  <p:par>
+                    <p:cTn id="7" fill="hold">
+                      <p:stCondLst>
+                        <p:cond delay="indefinite"/>
+                      </p:stCondLst>
+                      <p:childTnLst>
+                        <p:par>
+                          <p:cTn id="8" fill="hold">
+                            <p:stCondLst>
+                              <p:cond delay="0"/>
+                            </p:stCondLst>
+                            <p:childTnLst>
+                              <p:par>
+                                <p:cTn id="9" presetID="2" presetClass="entr" presetSubtype="4" fill="hold" nodeType="clickEffect">
+                                  <p:stCondLst>
+                                    <p:cond delay="0"/>
+                                  </p:stCondLst>
+                                  <p:childTnLst>
+                                    <p:set>
+                                      <p:cBhvr>
+                                        <p:cTn id="10" dur="1" fill="hold">
+                                          <p:stCondLst>
+                                            <p:cond delay="0"/>
+                                          </p:stCondLst>
+                                        </p:cTn>
+                                        <p:tgtEl>
+                                          <p:spTgt spid="6"/>
+                                        </p:tgtEl>
+                                        <p:attrNameLst>
+                                          <p:attrName>style.visibility</p:attrName>
+                                        </p:attrNameLst>
+                                      </p:cBhvr>
+                                      <p:to>
+                                        <p:strVal val="visible"/>
+                                      </p:to>
+                                    </p:set>
+                                    <p:anim calcmode="lin" valueType="num">
+                                      <p:cBhvr additive="base">
+                                        <p:cTn id="11" dur="500" fill="hold"/>
+                                        <p:tgtEl>
+                                          <p:spTgt spid="6"/>
+                                        </p:tgtEl>
+                                        <p:attrNameLst>
+                                          <p:attrName>ppt_x</p:attrName>
+                                        </p:attrNameLst>
+                                      </p:cBhvr>
+                                      <p:tavLst>
+                                        <p:tav tm="0">
+                                          <p:val>
+                                            <p:strVal val="#ppt_x"/>
+                                          </p:val>
+                                        </p:tav>
+                                        <p:tav tm="100000">
+                                          <p:val>
+                                            <p:strVal val="#ppt_x"/>
+                                          </p:val>
+                                        </p:tav>
+                                      </p:tavLst>
+                                    </p:anim>
+                                    <p:anim calcmode="lin" valueType="num">
+                                      <p:cBhvr additive="base">
+                                        <p:cTn id="12" dur="500" fill="hold"/>
+                                        <p:tgtEl>
+                                          <p:spTgt spid="6"/>
+                                        </p:tgtEl>
+                                        <p:attrNameLst>
+                                          <p:attrName>ppt_y</p:attrName>
+                                        </p:attrNameLst>
+                                      </p:cBhvr>
+                                      <p:tavLst>
+                                        <p:tav tm="0">
+                                          <p:val>
+                                            <p:strVal val="1+#ppt_h/2"/>
+                                          </p:val>
+                                        </p:tav>
+                                        <p:tav tm="100000">
+                                          <p:val>
+                                            <p:strVal val="#ppt_y"/>
+                                          </p:val>
+                                        </p:tav>
+                                      </p:tavLst>
+                                    </p:anim>
+                                  </p:childTnLst>
+                                </p:cTn>
+                              </p:par>
+                              <p:par>
+                                <p:cTn id="13" presetID="2" presetClass="entr" presetSubtype="4" fill="hold" nodeType="withEffect">
+                                  <p:stCondLst>
+                                    <p:cond delay="0"/>
+                                  </p:stCondLst>
+                                  <p:childTnLst>
+                                    <p:set>
+                                      <p:cBhvr>
+                                        <p:cTn id="14" dur="1" fill="hold">
+                                          <p:stCondLst>
+                                            <p:cond delay="0"/>
+                                          </p:stCondLst>
+                                        </p:cTn>
+                                        <p:tgtEl>
+                                          <p:spTgt spid="7"/>
+                                        </p:tgtEl>
+                                        <p:attrNameLst>
+                                          <p:attrName>style.visibility</p:attrName>
+                                        </p:attrNameLst>
+                                      </p:cBhvr>
+                                      <p:to>
+                                        <p:strVal val="visible"/>
+                                      </p:to>
+                                    </p:set>
+                                    <p:anim calcmode="lin" valueType="num">
+                                      <p:cBhvr additive="base">
+                                        <p:cTn id="15" dur="500" fill="hold"/>
+                                        <p:tgtEl>
+                                          <p:spTgt spid="7"/>
+                                        </p:tgtEl>
+                                        <p:attrNameLst>
+                                          <p:attrName>ppt_x</p:attrName>
+                                        </p:attrNameLst>
+                                      </p:cBhvr>
+                                      <p:tavLst>
+                                        <p:tav tm="0">
+                                          <p:val>
+                                            <p:strVal val="#ppt_x"/>
+                                          </p:val>
+                                        </p:tav>
+                                        <p:tav tm="100000">
+                                          <p:val>
+                                            <p:strVal val="#ppt_x"/>
+                                          </p:val>
+                                        </p:tav>
+                                      </p:tavLst>
+                                    </p:anim>
+                                    <p:anim calcmode="lin" valueType="num">
+                                      <p:cBhvr additive="base">
+                                        <p:cTn id="16" dur="500" fill="hold"/>
+                                        <p:tgtEl>
+                                          <p:spTgt spid="7"/>
+                                        </p:tgtEl>
+                                        <p:attrNameLst>
+                                          <p:attrName>ppt_y</p:attrName>
+                                        </p:attrNameLst>
+                                      </p:cBhvr>
+                                      <p:tavLst>
+                                        <p:tav tm="0">
+                                          <p:val>
+                                            <p:strVal val="1+#ppt_h/2"/>
+                                          </p:val>
+                                        </p:tav>
+                                        <p:tav tm="100000">
+                                          <p:val>
+                                            <p:strVal val="#ppt_y"/>
+                                          </p:val>
+                                        </p:tav>
+                                      </p:tavLst>
+                                    </p:anim>
+                                  </p:childTnLst>
+                                </p:cTn>
+                              </p:par>
+                            </p:childTnLst>
+                          </p:cTn>
+                        </p:par>
+                      </p:childTnLst>
+                    </p:cTn>
+                  </p:par>
+                </p:childTnLst>
+              </p:cTn>
+              <p:prevCondLst>
+                <p:cond evt="onPrev" delay="0">
+                  <p:tgtEl>
+                    <p:sldTgt/>
+                  </p:tgtEl>
+                </p:cond>
+              </p:prevCondLst>
+              <p:nextCondLst>
+                <p:cond evt="onNext" delay="0">
+                  <p:tgtEl>
+                    <p:sldTgt/>
+                  </p:tgtEl>
+                </p:cond>
+              </p:nextCondLst>
+            </p:seq>
+          </p:childTnLst>
+        </p:cTn>
+      </p:par>
+    </p:tnLst>
+  </p:timing>
 </p:sld>
 </file>
 
@@ -21530,7 +23055,7 @@
     </p:spTree>
     <p:extLst>
       <p:ext uri="{BB962C8B-B14F-4D97-AF65-F5344CB8AC3E}">
-        <p14:creationId xmlns:p14="http://schemas.microsoft.com/office/powerpoint/2010/main" val="21384242"/>
+        <p14:creationId xmlns:p14="http://schemas.microsoft.com/office/powerpoint/2010/main" val="1642662514"/>
       </p:ext>
     </p:extLst>
   </p:cSld>
@@ -21837,7 +23362,7 @@
     </p:spTree>
     <p:extLst>
       <p:ext uri="{BB962C8B-B14F-4D97-AF65-F5344CB8AC3E}">
-        <p14:creationId xmlns:p14="http://schemas.microsoft.com/office/powerpoint/2010/main" val="3480274110"/>
+        <p14:creationId xmlns:p14="http://schemas.microsoft.com/office/powerpoint/2010/main" val="3623349076"/>
       </p:ext>
     </p:extLst>
   </p:cSld>
@@ -22024,7 +23549,7 @@
     </p:spTree>
     <p:extLst>
       <p:ext uri="{BB962C8B-B14F-4D97-AF65-F5344CB8AC3E}">
-        <p14:creationId xmlns:p14="http://schemas.microsoft.com/office/powerpoint/2010/main" val="441301076"/>
+        <p14:creationId xmlns:p14="http://schemas.microsoft.com/office/powerpoint/2010/main" val="1149690424"/>
       </p:ext>
     </p:extLst>
   </p:cSld>

</xml_diff>